<commit_message>
updating for new search
</commit_message>
<xml_diff>
--- a/presentations/5a CS-Studio - Logbook.pptx
+++ b/presentations/5a CS-Studio - Logbook.pptx
@@ -239,7 +239,7 @@
           <a:p>
             <a:fld id="{A7A27A44-0D8A-4916-8372-FF726492F595}" type="datetimeFigureOut">
               <a:rPr lang="en-US" smtClean="0"/>
-              <a:t>3/27/2016</a:t>
+              <a:t>5/18/2016</a:t>
             </a:fld>
             <a:endParaRPr lang="en-US"/>
           </a:p>
@@ -2428,7 +2428,7 @@
           <a:p>
             <a:fld id="{3243CDE4-8370-4E4E-8F42-07F93DD3B773}" type="datetimeFigureOut">
               <a:rPr lang="en-US" smtClean="0"/>
-              <a:t>3/27/2016</a:t>
+              <a:t>5/18/2016</a:t>
             </a:fld>
             <a:endParaRPr lang="en-US"/>
           </a:p>
@@ -2598,7 +2598,7 @@
           <a:p>
             <a:fld id="{3243CDE4-8370-4E4E-8F42-07F93DD3B773}" type="datetimeFigureOut">
               <a:rPr lang="en-US" smtClean="0"/>
-              <a:t>3/27/2016</a:t>
+              <a:t>5/18/2016</a:t>
             </a:fld>
             <a:endParaRPr lang="en-US"/>
           </a:p>
@@ -2778,7 +2778,7 @@
           <a:p>
             <a:fld id="{3243CDE4-8370-4E4E-8F42-07F93DD3B773}" type="datetimeFigureOut">
               <a:rPr lang="en-US" smtClean="0"/>
-              <a:t>3/27/2016</a:t>
+              <a:t>5/18/2016</a:t>
             </a:fld>
             <a:endParaRPr lang="en-US"/>
           </a:p>
@@ -2948,7 +2948,7 @@
           <a:p>
             <a:fld id="{3243CDE4-8370-4E4E-8F42-07F93DD3B773}" type="datetimeFigureOut">
               <a:rPr lang="en-US" smtClean="0"/>
-              <a:t>3/27/2016</a:t>
+              <a:t>5/18/2016</a:t>
             </a:fld>
             <a:endParaRPr lang="en-US"/>
           </a:p>
@@ -3194,7 +3194,7 @@
           <a:p>
             <a:fld id="{3243CDE4-8370-4E4E-8F42-07F93DD3B773}" type="datetimeFigureOut">
               <a:rPr lang="en-US" smtClean="0"/>
-              <a:t>3/27/2016</a:t>
+              <a:t>5/18/2016</a:t>
             </a:fld>
             <a:endParaRPr lang="en-US"/>
           </a:p>
@@ -3426,7 +3426,7 @@
           <a:p>
             <a:fld id="{3243CDE4-8370-4E4E-8F42-07F93DD3B773}" type="datetimeFigureOut">
               <a:rPr lang="en-US" smtClean="0"/>
-              <a:t>3/27/2016</a:t>
+              <a:t>5/18/2016</a:t>
             </a:fld>
             <a:endParaRPr lang="en-US"/>
           </a:p>
@@ -3793,7 +3793,7 @@
           <a:p>
             <a:fld id="{3243CDE4-8370-4E4E-8F42-07F93DD3B773}" type="datetimeFigureOut">
               <a:rPr lang="en-US" smtClean="0"/>
-              <a:t>3/27/2016</a:t>
+              <a:t>5/18/2016</a:t>
             </a:fld>
             <a:endParaRPr lang="en-US"/>
           </a:p>
@@ -3911,7 +3911,7 @@
           <a:p>
             <a:fld id="{3243CDE4-8370-4E4E-8F42-07F93DD3B773}" type="datetimeFigureOut">
               <a:rPr lang="en-US" smtClean="0"/>
-              <a:t>3/27/2016</a:t>
+              <a:t>5/18/2016</a:t>
             </a:fld>
             <a:endParaRPr lang="en-US"/>
           </a:p>
@@ -4006,7 +4006,7 @@
           <a:p>
             <a:fld id="{3243CDE4-8370-4E4E-8F42-07F93DD3B773}" type="datetimeFigureOut">
               <a:rPr lang="en-US" smtClean="0"/>
-              <a:t>3/27/2016</a:t>
+              <a:t>5/18/2016</a:t>
             </a:fld>
             <a:endParaRPr lang="en-US"/>
           </a:p>
@@ -4283,7 +4283,7 @@
           <a:p>
             <a:fld id="{3243CDE4-8370-4E4E-8F42-07F93DD3B773}" type="datetimeFigureOut">
               <a:rPr lang="en-US" smtClean="0"/>
-              <a:t>3/27/2016</a:t>
+              <a:t>5/18/2016</a:t>
             </a:fld>
             <a:endParaRPr lang="en-US"/>
           </a:p>
@@ -4536,7 +4536,7 @@
           <a:p>
             <a:fld id="{3243CDE4-8370-4E4E-8F42-07F93DD3B773}" type="datetimeFigureOut">
               <a:rPr lang="en-US" smtClean="0"/>
-              <a:t>3/27/2016</a:t>
+              <a:t>5/18/2016</a:t>
             </a:fld>
             <a:endParaRPr lang="en-US"/>
           </a:p>
@@ -4749,7 +4749,7 @@
           <a:p>
             <a:fld id="{3243CDE4-8370-4E4E-8F42-07F93DD3B773}" type="datetimeFigureOut">
               <a:rPr lang="en-US" smtClean="0"/>
-              <a:t>3/27/2016</a:t>
+              <a:t>5/18/2016</a:t>
             </a:fld>
             <a:endParaRPr lang="en-US"/>
           </a:p>
@@ -5802,14 +5802,14 @@
           </a:ln>
           <a:extLst>
             <a:ext uri="{909E8E84-426E-40dd-AFC4-6F175D3DCCD1}">
-              <a14:hiddenFill xmlns:a14="http://schemas.microsoft.com/office/drawing/2010/main" xmlns="">
+              <a14:hiddenFill xmlns="" xmlns:a14="http://schemas.microsoft.com/office/drawing/2010/main">
                 <a:solidFill>
                   <a:srgbClr val="FFFFFF"/>
                 </a:solidFill>
               </a14:hiddenFill>
             </a:ext>
             <a:ext uri="{91240B29-F687-4f45-9708-019B960494DF}">
-              <a14:hiddenLine xmlns:a14="http://schemas.microsoft.com/office/drawing/2010/main" xmlns="" w="9525">
+              <a14:hiddenLine xmlns="" xmlns:a14="http://schemas.microsoft.com/office/drawing/2010/main" w="9525">
                 <a:solidFill>
                   <a:srgbClr val="000000"/>
                 </a:solidFill>
@@ -9341,11 +9341,7 @@
           <a:p>
             <a:r>
               <a:rPr lang="en-US" dirty="0" smtClean="0"/>
-              <a:t>Seamless integration with </a:t>
-            </a:r>
-            <a:r>
-              <a:rPr lang="en-US" dirty="0" smtClean="0"/>
-              <a:t>applications</a:t>
+              <a:t>Seamless integration with applications</a:t>
             </a:r>
           </a:p>
           <a:p>
@@ -9422,11 +9418,7 @@
           <a:p>
             <a:r>
               <a:rPr lang="en-US" dirty="0" smtClean="0"/>
-              <a:t>Creating log entries from </a:t>
-            </a:r>
-            <a:r>
-              <a:rPr lang="en-US" dirty="0" smtClean="0"/>
-              <a:t>applications (</a:t>
+              <a:t>Creating log entries from applications (</a:t>
             </a:r>
             <a:r>
               <a:rPr lang="en-US" dirty="0" err="1" smtClean="0"/>
@@ -9676,11 +9668,7 @@
           <a:p>
             <a:r>
               <a:rPr lang="en-US" dirty="0" smtClean="0"/>
-              <a:t>Alarm </a:t>
-            </a:r>
-            <a:r>
-              <a:rPr lang="en-US" dirty="0" smtClean="0"/>
-              <a:t>server </a:t>
+              <a:t>Alarm server </a:t>
             </a:r>
           </a:p>
           <a:p>
@@ -9916,23 +9904,13 @@
             </a:pPr>
             <a:r>
               <a:rPr lang="en-US" dirty="0" smtClean="0"/>
-              <a:t>Menu: </a:t>
-            </a:r>
-            <a:r>
-              <a:rPr lang="en-US" dirty="0" smtClean="0"/>
-              <a:t>Window </a:t>
+              <a:t>Menu: Window </a:t>
             </a:r>
             <a:r>
               <a:rPr lang="en-US" dirty="0" smtClean="0">
                 <a:sym typeface="Wingdings" panose="05000000000000000000" pitchFamily="2" charset="2"/>
               </a:rPr>
-              <a:t> </a:t>
-            </a:r>
-            <a:r>
-              <a:rPr lang="en-US" dirty="0" smtClean="0">
-                <a:sym typeface="Wingdings" panose="05000000000000000000" pitchFamily="2" charset="2"/>
-              </a:rPr>
-              <a:t>New Perspective  </a:t>
+              <a:t> New Perspective  </a:t>
             </a:r>
             <a:r>
               <a:rPr lang="en-US" dirty="0" err="1" smtClean="0">
@@ -9946,9 +9924,6 @@
               </a:rPr>
               <a:t> Perspective</a:t>
             </a:r>
-            <a:endParaRPr lang="en-US" dirty="0" smtClean="0">
-              <a:sym typeface="Wingdings" panose="05000000000000000000" pitchFamily="2" charset="2"/>
-            </a:endParaRPr>
           </a:p>
           <a:p>
             <a:pPr marL="342900" lvl="1" indent="-342900">
@@ -10238,10 +10213,15 @@
             <p:ph sz="half" idx="1"/>
           </p:nvPr>
         </p:nvSpPr>
-        <p:spPr/>
+        <p:spPr>
+          <a:xfrm>
+            <a:off x="843280" y="1712093"/>
+            <a:ext cx="5181600" cy="4351338"/>
+          </a:xfrm>
+        </p:spPr>
         <p:txBody>
           <a:bodyPr>
-            <a:normAutofit lnSpcReduction="10000"/>
+            <a:normAutofit/>
           </a:bodyPr>
           <a:lstStyle/>
           <a:p>
@@ -10323,61 +10303,17 @@
               <a:rPr lang="en-US" dirty="0" smtClean="0">
                 <a:sym typeface="Wingdings" panose="05000000000000000000" pitchFamily="2" charset="2"/>
               </a:rPr>
-              <a:t>* and ?</a:t>
+              <a:t>* and </a:t>
+            </a:r>
+            <a:r>
+              <a:rPr lang="en-US" dirty="0" smtClean="0">
+                <a:sym typeface="Wingdings" panose="05000000000000000000" pitchFamily="2" charset="2"/>
+              </a:rPr>
+              <a:t>?</a:t>
             </a:r>
             <a:endParaRPr lang="en-US" dirty="0">
               <a:sym typeface="Wingdings" panose="05000000000000000000" pitchFamily="2" charset="2"/>
             </a:endParaRPr>
-          </a:p>
-          <a:p>
-            <a:pPr marL="0" lvl="1" indent="0">
-              <a:spcBef>
-                <a:spcPts val="1000"/>
-              </a:spcBef>
-              <a:buNone/>
-            </a:pPr>
-            <a:r>
-              <a:rPr lang="en-US" dirty="0" smtClean="0">
-                <a:sym typeface="Wingdings" panose="05000000000000000000" pitchFamily="2" charset="2"/>
-              </a:rPr>
-              <a:t>e.g. </a:t>
-            </a:r>
-          </a:p>
-          <a:p>
-            <a:pPr marL="0" lvl="1" indent="0">
-              <a:spcBef>
-                <a:spcPts val="1000"/>
-              </a:spcBef>
-              <a:buNone/>
-            </a:pPr>
-            <a:r>
-              <a:rPr lang="en-US" dirty="0" smtClean="0">
-                <a:sym typeface="Wingdings" panose="05000000000000000000" pitchFamily="2" charset="2"/>
-              </a:rPr>
-              <a:t>“Alarm from:last8Hours”</a:t>
-            </a:r>
-          </a:p>
-          <a:p>
-            <a:pPr marL="342900" lvl="1" indent="-342900">
-              <a:spcBef>
-                <a:spcPts val="1000"/>
-              </a:spcBef>
-            </a:pPr>
-            <a:r>
-              <a:rPr lang="en-US" dirty="0" err="1" smtClean="0">
-                <a:sym typeface="Wingdings" panose="05000000000000000000" pitchFamily="2" charset="2"/>
-              </a:rPr>
-              <a:t>Adv</a:t>
-            </a:r>
-            <a:r>
-              <a:rPr lang="en-US" dirty="0" smtClean="0">
-                <a:sym typeface="Wingdings" panose="05000000000000000000" pitchFamily="2" charset="2"/>
-              </a:rPr>
-              <a:t> Search dialog</a:t>
-            </a:r>
-          </a:p>
-          <a:p>
-            <a:endParaRPr lang="en-US" dirty="0"/>
           </a:p>
         </p:txBody>
       </p:sp>
@@ -10423,32 +10359,8 @@
         </p:blipFill>
         <p:spPr>
           <a:xfrm>
-            <a:off x="6019800" y="2663134"/>
+            <a:off x="6019800" y="3160974"/>
             <a:ext cx="5334000" cy="1864687"/>
-          </a:xfrm>
-          <a:prstGeom prst="rect">
-            <a:avLst/>
-          </a:prstGeom>
-        </p:spPr>
-      </p:pic>
-      <p:pic>
-        <p:nvPicPr>
-          <p:cNvPr id="7" name="Picture 6"/>
-          <p:cNvPicPr>
-            <a:picLocks noChangeAspect="1"/>
-          </p:cNvPicPr>
-          <p:nvPr/>
-        </p:nvPicPr>
-        <p:blipFill>
-          <a:blip r:embed="rId4"/>
-          <a:stretch>
-            <a:fillRect/>
-          </a:stretch>
-        </p:blipFill>
-        <p:spPr>
-          <a:xfrm>
-            <a:off x="6019800" y="3837995"/>
-            <a:ext cx="5334000" cy="2622402"/>
           </a:xfrm>
           <a:prstGeom prst="rect">
             <a:avLst/>
@@ -12274,14 +12186,14 @@
           </a:ln>
           <a:extLst>
             <a:ext uri="{909E8E84-426E-40dd-AFC4-6F175D3DCCD1}">
-              <a14:hiddenFill xmlns:a14="http://schemas.microsoft.com/office/drawing/2010/main" xmlns="">
+              <a14:hiddenFill xmlns="" xmlns:a14="http://schemas.microsoft.com/office/drawing/2010/main">
                 <a:solidFill>
                   <a:srgbClr val="FFFFFF"/>
                 </a:solidFill>
               </a14:hiddenFill>
             </a:ext>
             <a:ext uri="{91240B29-F687-4f45-9708-019B960494DF}">
-              <a14:hiddenLine xmlns:a14="http://schemas.microsoft.com/office/drawing/2010/main" xmlns="" w="9525">
+              <a14:hiddenLine xmlns="" xmlns:a14="http://schemas.microsoft.com/office/drawing/2010/main" w="9525">
                 <a:solidFill>
                   <a:srgbClr val="000000"/>
                 </a:solidFill>
@@ -15291,14 +15203,14 @@
           </a:ln>
           <a:extLst>
             <a:ext uri="{909E8E84-426E-40dd-AFC4-6F175D3DCCD1}">
-              <a14:hiddenFill xmlns:a14="http://schemas.microsoft.com/office/drawing/2010/main" xmlns="">
+              <a14:hiddenFill xmlns="" xmlns:a14="http://schemas.microsoft.com/office/drawing/2010/main">
                 <a:solidFill>
                   <a:schemeClr val="accent1"/>
                 </a:solidFill>
               </a14:hiddenFill>
             </a:ext>
             <a:ext uri="{91240B29-F687-4f45-9708-019B960494DF}">
-              <a14:hiddenLine xmlns:a14="http://schemas.microsoft.com/office/drawing/2010/main" xmlns="" w="9525">
+              <a14:hiddenLine xmlns="" xmlns:a14="http://schemas.microsoft.com/office/drawing/2010/main" w="9525">
                 <a:solidFill>
                   <a:schemeClr val="tx1"/>
                 </a:solidFill>
@@ -15574,14 +15486,14 @@
           </a:ln>
           <a:extLst>
             <a:ext uri="{909E8E84-426E-40dd-AFC4-6F175D3DCCD1}">
-              <a14:hiddenFill xmlns:a14="http://schemas.microsoft.com/office/drawing/2010/main" xmlns="">
+              <a14:hiddenFill xmlns="" xmlns:a14="http://schemas.microsoft.com/office/drawing/2010/main">
                 <a:solidFill>
                   <a:schemeClr val="accent1"/>
                 </a:solidFill>
               </a14:hiddenFill>
             </a:ext>
             <a:ext uri="{91240B29-F687-4f45-9708-019B960494DF}">
-              <a14:hiddenLine xmlns:a14="http://schemas.microsoft.com/office/drawing/2010/main" xmlns="" w="9525">
+              <a14:hiddenLine xmlns="" xmlns:a14="http://schemas.microsoft.com/office/drawing/2010/main" w="9525">
                 <a:solidFill>
                   <a:schemeClr val="tx1"/>
                 </a:solidFill>
@@ -15696,14 +15608,14 @@
           </a:ln>
           <a:extLst>
             <a:ext uri="{909E8E84-426E-40dd-AFC4-6F175D3DCCD1}">
-              <a14:hiddenFill xmlns:a14="http://schemas.microsoft.com/office/drawing/2010/main" xmlns="">
+              <a14:hiddenFill xmlns="" xmlns:a14="http://schemas.microsoft.com/office/drawing/2010/main">
                 <a:solidFill>
                   <a:schemeClr val="accent1"/>
                 </a:solidFill>
               </a14:hiddenFill>
             </a:ext>
             <a:ext uri="{91240B29-F687-4f45-9708-019B960494DF}">
-              <a14:hiddenLine xmlns:a14="http://schemas.microsoft.com/office/drawing/2010/main" xmlns="" w="9525">
+              <a14:hiddenLine xmlns="" xmlns:a14="http://schemas.microsoft.com/office/drawing/2010/main" w="9525">
                 <a:solidFill>
                   <a:schemeClr val="tx1"/>
                 </a:solidFill>
@@ -17014,14 +16926,14 @@
           </a:ln>
           <a:extLst>
             <a:ext uri="{909E8E84-426E-40dd-AFC4-6F175D3DCCD1}">
-              <a14:hiddenFill xmlns:a14="http://schemas.microsoft.com/office/drawing/2010/main" xmlns="">
+              <a14:hiddenFill xmlns="" xmlns:a14="http://schemas.microsoft.com/office/drawing/2010/main">
                 <a:solidFill>
                   <a:srgbClr val="FFFFFF"/>
                 </a:solidFill>
               </a14:hiddenFill>
             </a:ext>
             <a:ext uri="{91240B29-F687-4f45-9708-019B960494DF}">
-              <a14:hiddenLine xmlns:a14="http://schemas.microsoft.com/office/drawing/2010/main" xmlns="" w="9525">
+              <a14:hiddenLine xmlns="" xmlns:a14="http://schemas.microsoft.com/office/drawing/2010/main" w="9525">
                 <a:solidFill>
                   <a:srgbClr val="000000"/>
                 </a:solidFill>

</xml_diff>